<commit_message>
apresentação da parte 2
</commit_message>
<xml_diff>
--- a/parte2/Treinamento 2 - JavaScript - Parte 2 (Revisado 23.10.2017).pptx
+++ b/parte2/Treinamento 2 - JavaScript - Parte 2 (Revisado 23.10.2017).pptx
@@ -235,7 +235,7 @@
           <a:p>
             <a:fld id="{9B6BF049-9374-4F1D-9012-2492B7F95F04}" type="datetimeFigureOut">
               <a:rPr lang="pt-BR" smtClean="0"/>
-              <a:t>21/01/2018</a:t>
+              <a:t>22/01/2018</a:t>
             </a:fld>
             <a:endParaRPr lang="pt-BR"/>
           </a:p>
@@ -2265,7 +2265,7 @@
           <a:p>
             <a:fld id="{744CA574-0275-4727-8E86-D431B89400F6}" type="datetime1">
               <a:rPr lang="pt-BR" smtClean="0"/>
-              <a:t>21/01/2018</a:t>
+              <a:t>22/01/2018</a:t>
             </a:fld>
             <a:endParaRPr lang="pt-BR"/>
           </a:p>
@@ -2438,7 +2438,7 @@
           <a:p>
             <a:fld id="{EA9BB5FB-3271-4F9A-A1B1-C31985B5A00D}" type="datetime1">
               <a:rPr lang="pt-BR" smtClean="0"/>
-              <a:t>21/01/2018</a:t>
+              <a:t>22/01/2018</a:t>
             </a:fld>
             <a:endParaRPr lang="pt-BR"/>
           </a:p>
@@ -2713,7 +2713,7 @@
           <a:p>
             <a:fld id="{1D27497E-89E0-4457-9D50-B71CC669FCFC}" type="datetime1">
               <a:rPr lang="pt-BR" smtClean="0"/>
-              <a:t>21/01/2018</a:t>
+              <a:t>22/01/2018</a:t>
             </a:fld>
             <a:endParaRPr lang="pt-BR"/>
           </a:p>
@@ -2965,7 +2965,7 @@
           <a:p>
             <a:fld id="{2E6E8A51-9577-4D92-96AA-BE8BFE6948C5}" type="datetime1">
               <a:rPr lang="pt-BR" smtClean="0"/>
-              <a:t>21/01/2018</a:t>
+              <a:t>22/01/2018</a:t>
             </a:fld>
             <a:endParaRPr lang="pt-BR"/>
           </a:p>
@@ -3159,7 +3159,7 @@
           <a:p>
             <a:fld id="{A1B92794-AE9E-4DA1-AD30-EFFC9163F2B3}" type="datetime1">
               <a:rPr lang="pt-BR" smtClean="0"/>
-              <a:t>21/01/2018</a:t>
+              <a:t>22/01/2018</a:t>
             </a:fld>
             <a:endParaRPr lang="en-US" dirty="0"/>
           </a:p>
@@ -3457,7 +3457,7 @@
           <a:p>
             <a:fld id="{A1D1A6C1-AE08-401D-9AF1-7DBFAAC75FEA}" type="datetime1">
               <a:rPr lang="pt-BR" smtClean="0"/>
-              <a:t>21/01/2018</a:t>
+              <a:t>22/01/2018</a:t>
             </a:fld>
             <a:endParaRPr lang="pt-BR"/>
           </a:p>
@@ -3798,7 +3798,7 @@
           <a:p>
             <a:fld id="{C88F16AB-E7F3-4DF6-9BFF-79044FC97346}" type="datetime1">
               <a:rPr lang="pt-BR" smtClean="0"/>
-              <a:t>21/01/2018</a:t>
+              <a:t>22/01/2018</a:t>
             </a:fld>
             <a:endParaRPr lang="pt-BR"/>
           </a:p>
@@ -4376,7 +4376,7 @@
           <a:p>
             <a:fld id="{158E9144-6818-4837-93DC-BD8DC9AD81B3}" type="datetime1">
               <a:rPr lang="pt-BR" smtClean="0"/>
-              <a:t>21/01/2018</a:t>
+              <a:t>22/01/2018</a:t>
             </a:fld>
             <a:endParaRPr lang="pt-BR"/>
           </a:p>
@@ -4738,7 +4738,7 @@
           <a:p>
             <a:fld id="{32BA1D34-CC38-4D8C-AFD3-6F0CC5C1997C}" type="datetime1">
               <a:rPr lang="pt-BR" smtClean="0"/>
-              <a:t>21/01/2018</a:t>
+              <a:t>22/01/2018</a:t>
             </a:fld>
             <a:endParaRPr lang="pt-BR"/>
           </a:p>
@@ -5053,7 +5053,7 @@
           <a:p>
             <a:fld id="{6E5CEDC8-2664-42FF-A9D9-DDD6FF5CFEBF}" type="datetime1">
               <a:rPr lang="pt-BR" smtClean="0"/>
-              <a:t>21/01/2018</a:t>
+              <a:t>22/01/2018</a:t>
             </a:fld>
             <a:endParaRPr lang="pt-BR"/>
           </a:p>
@@ -5511,7 +5511,7 @@
           <a:p>
             <a:fld id="{A4E218A1-A94F-44A9-BECC-EE5EDB2D8A12}" type="datetime1">
               <a:rPr lang="pt-BR" smtClean="0"/>
-              <a:t>21/01/2018</a:t>
+              <a:t>22/01/2018</a:t>
             </a:fld>
             <a:endParaRPr lang="pt-BR"/>
           </a:p>
@@ -5674,7 +5674,7 @@
           <a:p>
             <a:fld id="{5A7797BF-B59B-42D7-BC31-2EFC97353070}" type="datetime1">
               <a:rPr lang="pt-BR" smtClean="0"/>
-              <a:t>21/01/2018</a:t>
+              <a:t>22/01/2018</a:t>
             </a:fld>
             <a:endParaRPr lang="pt-BR"/>
           </a:p>
@@ -5885,7 +5885,7 @@
           <a:p>
             <a:fld id="{45899652-41B9-4498-A817-021740982A94}" type="datetime1">
               <a:rPr lang="pt-BR" smtClean="0"/>
-              <a:t>21/01/2018</a:t>
+              <a:t>22/01/2018</a:t>
             </a:fld>
             <a:endParaRPr lang="pt-BR"/>
           </a:p>
@@ -7385,7 +7385,7 @@
             </a:r>
           </a:p>
           <a:p>
-            <a:pPr marL="0" indent="0">
+            <a:pPr marL="457200" lvl="1" indent="0">
               <a:buNone/>
             </a:pPr>
             <a:r>
@@ -10626,7 +10626,31 @@
             </a:br>
             <a:r>
               <a:rPr lang="en-US" dirty="0"/>
-              <a:t>    alert($(</a:t>
+              <a:t>    </a:t>
+            </a:r>
+            <a:r>
+              <a:rPr lang="en-US" dirty="0" smtClean="0"/>
+              <a:t>alert($(</a:t>
+            </a:r>
+            <a:r>
+              <a:rPr lang="en-US" dirty="0" smtClean="0">
+                <a:solidFill>
+                  <a:srgbClr val="C00000"/>
+                </a:solidFill>
+              </a:rPr>
+              <a:t>“#w3s”</a:t>
+            </a:r>
+            <a:r>
+              <a:rPr lang="en-US" dirty="0" smtClean="0"/>
+              <a:t>).</a:t>
+            </a:r>
+            <a:r>
+              <a:rPr lang="en-US" dirty="0" err="1" smtClean="0"/>
+              <a:t>attr</a:t>
+            </a:r>
+            <a:r>
+              <a:rPr lang="en-US" dirty="0"/>
+              <a:t>(</a:t>
             </a:r>
             <a:r>
               <a:rPr lang="en-US" dirty="0">
@@ -10634,19 +10658,15 @@
                   <a:srgbClr val="C00000"/>
                 </a:solidFill>
               </a:rPr>
-              <a:t>“#w3s”</a:t>
-            </a:r>
-            <a:r>
-              <a:rPr lang="en-US" dirty="0"/>
-              <a:t>).</a:t>
-            </a:r>
-            <a:r>
-              <a:rPr lang="en-US" dirty="0" err="1"/>
-              <a:t>attr</a:t>
-            </a:r>
-            <a:r>
-              <a:rPr lang="en-US" dirty="0"/>
-              <a:t>(</a:t>
+              <a:t>“</a:t>
+            </a:r>
+            <a:r>
+              <a:rPr lang="en-US" dirty="0" err="1">
+                <a:solidFill>
+                  <a:srgbClr val="C00000"/>
+                </a:solidFill>
+              </a:rPr>
+              <a:t>href</a:t>
             </a:r>
             <a:r>
               <a:rPr lang="en-US" dirty="0">
@@ -10654,22 +10674,6 @@
                   <a:srgbClr val="C00000"/>
                 </a:solidFill>
               </a:rPr>
-              <a:t>“</a:t>
-            </a:r>
-            <a:r>
-              <a:rPr lang="en-US" dirty="0" err="1">
-                <a:solidFill>
-                  <a:srgbClr val="C00000"/>
-                </a:solidFill>
-              </a:rPr>
-              <a:t>href</a:t>
-            </a:r>
-            <a:r>
-              <a:rPr lang="en-US" dirty="0">
-                <a:solidFill>
-                  <a:srgbClr val="C00000"/>
-                </a:solidFill>
-              </a:rPr>
               <a:t>”</a:t>
             </a:r>
             <a:r>
@@ -10680,7 +10684,7 @@
               <a:rPr lang="en-US" dirty="0"/>
             </a:br>
             <a:r>
-              <a:rPr lang="en-US" dirty="0"/>
+              <a:rPr lang="en-US" dirty="0" smtClean="0"/>
               <a:t>});</a:t>
             </a:r>
             <a:r>
@@ -11273,7 +11277,7 @@
               <a:t>href</a:t>
             </a:r>
             <a:r>
-              <a:rPr lang="en-US" dirty="0">
+              <a:rPr lang="en-US" dirty="0" smtClean="0">
                 <a:solidFill>
                   <a:srgbClr val="C00000"/>
                 </a:solidFill>
@@ -11281,7 +11285,7 @@
               <a:t>”</a:t>
             </a:r>
             <a:r>
-              <a:rPr lang="en-US" dirty="0"/>
+              <a:rPr lang="en-US" dirty="0" smtClean="0"/>
               <a:t>, </a:t>
             </a:r>
             <a:r>
@@ -11952,8 +11956,12 @@
               <a:t>addClass</a:t>
             </a:r>
             <a:r>
-              <a:rPr lang="en-US" dirty="0"/>
-              <a:t>() – </a:t>
+              <a:rPr lang="en-US" dirty="0" smtClean="0"/>
+              <a:t>() </a:t>
+            </a:r>
+            <a:r>
+              <a:rPr lang="en-US" dirty="0"/>
+              <a:t>– </a:t>
             </a:r>
             <a:r>
               <a:rPr lang="en-US" dirty="0" err="1"/>
@@ -13053,8 +13061,8 @@
         </p:blipFill>
         <p:spPr>
           <a:xfrm>
-            <a:off x="3819525" y="2291556"/>
-            <a:ext cx="4552950" cy="3419475"/>
+            <a:off x="1828800" y="1300956"/>
+            <a:ext cx="7421880" cy="4811588"/>
           </a:xfrm>
         </p:spPr>
       </p:pic>
@@ -13390,8 +13398,8 @@
         </p:blipFill>
         <p:spPr>
           <a:xfrm>
-            <a:off x="4310062" y="3709987"/>
-            <a:ext cx="3571875" cy="1724025"/>
+            <a:off x="1546860" y="2875613"/>
+            <a:ext cx="9098280" cy="3301350"/>
           </a:xfrm>
           <a:prstGeom prst="rect">
             <a:avLst/>
@@ -15306,11 +15314,7 @@
             </a:r>
             <a:r>
               <a:rPr lang="en-US" dirty="0" smtClean="0"/>
-              <a:t>    </a:t>
-            </a:r>
-            <a:r>
-              <a:rPr lang="en-US" dirty="0" smtClean="0"/>
-              <a:t>data: {},</a:t>
+              <a:t>    data: {},</a:t>
             </a:r>
           </a:p>
           <a:p>
@@ -15345,10 +15349,6 @@
             <a:r>
               <a:rPr lang="en-US" dirty="0" smtClean="0"/>
               <a:t>(){}</a:t>
-            </a:r>
-            <a:r>
-              <a:rPr lang="en-US" dirty="0" smtClean="0"/>
-              <a:t/>
             </a:r>
             <a:br>
               <a:rPr lang="en-US" dirty="0" smtClean="0"/>
@@ -17556,16 +17556,12 @@
               <a:t>{ </a:t>
             </a:r>
             <a:r>
-              <a:rPr lang="en-US" dirty="0" smtClean="0"/>
-              <a:t>“</a:t>
-            </a:r>
-            <a:r>
               <a:rPr lang="en-US" dirty="0" err="1" smtClean="0"/>
               <a:t>nome</a:t>
             </a:r>
             <a:r>
               <a:rPr lang="en-US" dirty="0" smtClean="0"/>
-              <a:t>”: </a:t>
+              <a:t>: </a:t>
             </a:r>
             <a:r>
               <a:rPr lang="en-US" dirty="0">
@@ -17594,10 +17590,6 @@
             <a:r>
               <a:rPr lang="en-US" dirty="0"/>
               <a:t>, </a:t>
-            </a:r>
-            <a:r>
-              <a:rPr lang="en-US" dirty="0" smtClean="0"/>
-              <a:t>“</a:t>
             </a:r>
             <a:r>
               <a:rPr lang="en-US" dirty="0" err="1" smtClean="0"/>
@@ -17605,7 +17597,7 @@
             </a:r>
             <a:r>
               <a:rPr lang="en-US" dirty="0" smtClean="0"/>
-              <a:t>”: </a:t>
+              <a:t>: </a:t>
             </a:r>
             <a:r>
               <a:rPr lang="en-US" dirty="0">
@@ -17634,10 +17626,6 @@
             <a:r>
               <a:rPr lang="en-US" dirty="0"/>
               <a:t>, </a:t>
-            </a:r>
-            <a:r>
-              <a:rPr lang="en-US" dirty="0" smtClean="0"/>
-              <a:t>“</a:t>
             </a:r>
             <a:r>
               <a:rPr lang="en-US" dirty="0" err="1" smtClean="0"/>
@@ -17645,7 +17633,7 @@
             </a:r>
             <a:r>
               <a:rPr lang="en-US" dirty="0" smtClean="0"/>
-              <a:t>”: </a:t>
+              <a:t>: </a:t>
             </a:r>
             <a:r>
               <a:rPr lang="en-US" dirty="0">
@@ -17658,6 +17646,10 @@
             <a:r>
               <a:rPr lang="en-US" dirty="0"/>
               <a:t>, </a:t>
+            </a:r>
+            <a:r>
+              <a:rPr lang="en-US" dirty="0" smtClean="0"/>
+              <a:t>"</a:t>
             </a:r>
             <a:r>
               <a:rPr lang="en-US" dirty="0" err="1" smtClean="0"/>

</xml_diff>